<commit_message>
agregamos caract a ppt de base de datos
</commit_message>
<xml_diff>
--- a/deposito-de-archivos/Tablas Vecinos Colaborativos.pptx
+++ b/deposito-de-archivos/Tablas Vecinos Colaborativos.pptx
@@ -104,6 +104,11 @@
       </a:defRPr>
     </a:lvl9pPr>
   </p:defaultTextStyle>
+  <p:extLst>
+    <p:ext uri="{EFAFB233-063F-42B5-8137-9DF3F51BA10A}">
+      <p15:sldGuideLst xmlns:p15="http://schemas.microsoft.com/office/powerpoint/2012/main"/>
+    </p:ext>
+  </p:extLst>
 </p:presentation>
 </file>
 
@@ -238,7 +243,7 @@
           <a:p>
             <a:fld id="{85D24840-F501-4923-86F2-CAA58B03A346}" type="datetimeFigureOut">
               <a:rPr lang="es-PA" smtClean="0"/>
-              <a:t>13/6/19</a:t>
+              <a:t>30/7/19</a:t>
             </a:fld>
             <a:endParaRPr lang="es-PA"/>
           </a:p>
@@ -408,7 +413,7 @@
           <a:p>
             <a:fld id="{85D24840-F501-4923-86F2-CAA58B03A346}" type="datetimeFigureOut">
               <a:rPr lang="es-PA" smtClean="0"/>
-              <a:t>13/6/19</a:t>
+              <a:t>30/7/19</a:t>
             </a:fld>
             <a:endParaRPr lang="es-PA"/>
           </a:p>
@@ -588,7 +593,7 @@
           <a:p>
             <a:fld id="{85D24840-F501-4923-86F2-CAA58B03A346}" type="datetimeFigureOut">
               <a:rPr lang="es-PA" smtClean="0"/>
-              <a:t>13/6/19</a:t>
+              <a:t>30/7/19</a:t>
             </a:fld>
             <a:endParaRPr lang="es-PA"/>
           </a:p>
@@ -758,7 +763,7 @@
           <a:p>
             <a:fld id="{85D24840-F501-4923-86F2-CAA58B03A346}" type="datetimeFigureOut">
               <a:rPr lang="es-PA" smtClean="0"/>
-              <a:t>13/6/19</a:t>
+              <a:t>30/7/19</a:t>
             </a:fld>
             <a:endParaRPr lang="es-PA"/>
           </a:p>
@@ -1004,7 +1009,7 @@
           <a:p>
             <a:fld id="{85D24840-F501-4923-86F2-CAA58B03A346}" type="datetimeFigureOut">
               <a:rPr lang="es-PA" smtClean="0"/>
-              <a:t>13/6/19</a:t>
+              <a:t>30/7/19</a:t>
             </a:fld>
             <a:endParaRPr lang="es-PA"/>
           </a:p>
@@ -1236,7 +1241,7 @@
           <a:p>
             <a:fld id="{85D24840-F501-4923-86F2-CAA58B03A346}" type="datetimeFigureOut">
               <a:rPr lang="es-PA" smtClean="0"/>
-              <a:t>13/6/19</a:t>
+              <a:t>30/7/19</a:t>
             </a:fld>
             <a:endParaRPr lang="es-PA"/>
           </a:p>
@@ -1603,7 +1608,7 @@
           <a:p>
             <a:fld id="{85D24840-F501-4923-86F2-CAA58B03A346}" type="datetimeFigureOut">
               <a:rPr lang="es-PA" smtClean="0"/>
-              <a:t>13/6/19</a:t>
+              <a:t>30/7/19</a:t>
             </a:fld>
             <a:endParaRPr lang="es-PA"/>
           </a:p>
@@ -1721,7 +1726,7 @@
           <a:p>
             <a:fld id="{85D24840-F501-4923-86F2-CAA58B03A346}" type="datetimeFigureOut">
               <a:rPr lang="es-PA" smtClean="0"/>
-              <a:t>13/6/19</a:t>
+              <a:t>30/7/19</a:t>
             </a:fld>
             <a:endParaRPr lang="es-PA"/>
           </a:p>
@@ -1816,7 +1821,7 @@
           <a:p>
             <a:fld id="{85D24840-F501-4923-86F2-CAA58B03A346}" type="datetimeFigureOut">
               <a:rPr lang="es-PA" smtClean="0"/>
-              <a:t>13/6/19</a:t>
+              <a:t>30/7/19</a:t>
             </a:fld>
             <a:endParaRPr lang="es-PA"/>
           </a:p>
@@ -2093,7 +2098,7 @@
           <a:p>
             <a:fld id="{85D24840-F501-4923-86F2-CAA58B03A346}" type="datetimeFigureOut">
               <a:rPr lang="es-PA" smtClean="0"/>
-              <a:t>13/6/19</a:t>
+              <a:t>30/7/19</a:t>
             </a:fld>
             <a:endParaRPr lang="es-PA"/>
           </a:p>
@@ -2346,7 +2351,7 @@
           <a:p>
             <a:fld id="{85D24840-F501-4923-86F2-CAA58B03A346}" type="datetimeFigureOut">
               <a:rPr lang="es-PA" smtClean="0"/>
-              <a:t>13/6/19</a:t>
+              <a:t>30/7/19</a:t>
             </a:fld>
             <a:endParaRPr lang="es-PA"/>
           </a:p>
@@ -2559,7 +2564,7 @@
           <a:p>
             <a:fld id="{85D24840-F501-4923-86F2-CAA58B03A346}" type="datetimeFigureOut">
               <a:rPr lang="es-PA" smtClean="0"/>
-              <a:t>13/6/19</a:t>
+              <a:t>30/7/19</a:t>
             </a:fld>
             <a:endParaRPr lang="es-PA"/>
           </a:p>
@@ -4188,7 +4193,7 @@
           <p:nvPr>
             <p:extLst>
               <p:ext uri="{D42A27DB-BD31-4B8C-83A1-F6EECF244321}">
-                <p14:modId xmlns:p14="http://schemas.microsoft.com/office/powerpoint/2010/main" val="3819672216"/>
+                <p14:modId xmlns:p14="http://schemas.microsoft.com/office/powerpoint/2010/main" val="993765506"/>
               </p:ext>
             </p:extLst>
           </p:nvPr>
@@ -4212,7 +4217,7 @@
                     <a:p>
                       <a:pPr algn="l" fontAlgn="b"/>
                       <a:r>
-                        <a:rPr lang="es-PA" sz="1100" b="1" i="0" u="none" strike="noStrike">
+                        <a:rPr lang="es-PA" sz="1100" b="1" i="0" u="none" strike="noStrike" dirty="0">
                           <a:solidFill>
                             <a:srgbClr val="000000"/>
                           </a:solidFill>
@@ -4402,7 +4407,17 @@
                           <a:effectLst/>
                           <a:latin typeface="Calibri" panose="020F0502020204030204" pitchFamily="34" charset="0"/>
                         </a:rPr>
-                        <a:t> Texto</a:t>
+                        <a:t> </a:t>
+                      </a:r>
+                      <a:r>
+                        <a:rPr lang="es-PA" sz="1100" b="0" i="0" u="none" strike="noStrike" dirty="0" smtClean="0">
+                          <a:solidFill>
+                            <a:srgbClr val="000000"/>
+                          </a:solidFill>
+                          <a:effectLst/>
+                          <a:latin typeface="Calibri" panose="020F0502020204030204" pitchFamily="34" charset="0"/>
+                        </a:rPr>
+                        <a:t>Descripción</a:t>
                       </a:r>
                       <a:endParaRPr lang="es-PA" sz="1100" b="0" i="0" u="none" strike="noStrike" dirty="0">
                         <a:solidFill>
@@ -4564,8 +4579,25 @@
                           <a:effectLst/>
                           <a:latin typeface="Calibri" panose="020F0502020204030204" pitchFamily="34" charset="0"/>
                         </a:rPr>
-                        <a:t> Comentario</a:t>
+                        <a:t> </a:t>
                       </a:r>
+                      <a:r>
+                        <a:rPr lang="es-PA" sz="1100" b="0" i="0" u="none" strike="noStrike" dirty="0" smtClean="0">
+                          <a:solidFill>
+                            <a:srgbClr val="000000"/>
+                          </a:solidFill>
+                          <a:effectLst/>
+                          <a:latin typeface="Calibri" panose="020F0502020204030204" pitchFamily="34" charset="0"/>
+                        </a:rPr>
+                        <a:t>Título</a:t>
+                      </a:r>
+                      <a:endParaRPr lang="es-PA" sz="1100" b="0" i="0" u="none" strike="noStrike" dirty="0" smtClean="0">
+                        <a:solidFill>
+                          <a:srgbClr val="000000"/>
+                        </a:solidFill>
+                        <a:effectLst/>
+                        <a:latin typeface="Calibri" panose="020F0502020204030204" pitchFamily="34" charset="0"/>
+                      </a:endParaRPr>
                     </a:p>
                     <a:p>
                       <a:pPr algn="l" fontAlgn="b"/>
@@ -5993,7 +6025,6 @@
               <a:rPr lang="es-PA" dirty="0"/>
               <a:t>1</a:t>
             </a:r>
-            <a:endParaRPr lang="es-PA" dirty="0"/>
           </a:p>
         </p:txBody>
       </p:sp>
@@ -6173,7 +6204,6 @@
               <a:rPr lang="es-PA" dirty="0"/>
               <a:t>1</a:t>
             </a:r>
-            <a:endParaRPr lang="es-PA" dirty="0"/>
           </a:p>
         </p:txBody>
       </p:sp>
@@ -6233,7 +6263,6 @@
               <a:rPr lang="es-PA" dirty="0"/>
               <a:t>M</a:t>
             </a:r>
-            <a:endParaRPr lang="es-PA" dirty="0"/>
           </a:p>
         </p:txBody>
       </p:sp>

</xml_diff>

<commit_message>
Cambie los nombres de las columnas de las tablas users y posts en el powerpoint a inglés.
</commit_message>
<xml_diff>
--- a/deposito-de-archivos/Tablas Vecinos Colaborativos.pptx
+++ b/deposito-de-archivos/Tablas Vecinos Colaborativos.pptx
@@ -106,7 +106,7 @@
   </p:defaultTextStyle>
   <p:extLst>
     <p:ext uri="{EFAFB233-063F-42B5-8137-9DF3F51BA10A}">
-      <p15:sldGuideLst xmlns:p15="http://schemas.microsoft.com/office/powerpoint/2012/main"/>
+      <p15:sldGuideLst xmlns:p15="http://schemas.microsoft.com/office/powerpoint/2012/main" xmlns=""/>
     </p:ext>
   </p:extLst>
 </p:presentation>
@@ -243,7 +243,7 @@
           <a:p>
             <a:fld id="{85D24840-F501-4923-86F2-CAA58B03A346}" type="datetimeFigureOut">
               <a:rPr lang="es-PA" smtClean="0"/>
-              <a:t>30/7/19</a:t>
+              <a:t>08/01/2019</a:t>
             </a:fld>
             <a:endParaRPr lang="es-PA"/>
           </a:p>
@@ -413,7 +413,7 @@
           <a:p>
             <a:fld id="{85D24840-F501-4923-86F2-CAA58B03A346}" type="datetimeFigureOut">
               <a:rPr lang="es-PA" smtClean="0"/>
-              <a:t>30/7/19</a:t>
+              <a:t>08/01/2019</a:t>
             </a:fld>
             <a:endParaRPr lang="es-PA"/>
           </a:p>
@@ -593,7 +593,7 @@
           <a:p>
             <a:fld id="{85D24840-F501-4923-86F2-CAA58B03A346}" type="datetimeFigureOut">
               <a:rPr lang="es-PA" smtClean="0"/>
-              <a:t>30/7/19</a:t>
+              <a:t>08/01/2019</a:t>
             </a:fld>
             <a:endParaRPr lang="es-PA"/>
           </a:p>
@@ -763,7 +763,7 @@
           <a:p>
             <a:fld id="{85D24840-F501-4923-86F2-CAA58B03A346}" type="datetimeFigureOut">
               <a:rPr lang="es-PA" smtClean="0"/>
-              <a:t>30/7/19</a:t>
+              <a:t>08/01/2019</a:t>
             </a:fld>
             <a:endParaRPr lang="es-PA"/>
           </a:p>
@@ -1009,7 +1009,7 @@
           <a:p>
             <a:fld id="{85D24840-F501-4923-86F2-CAA58B03A346}" type="datetimeFigureOut">
               <a:rPr lang="es-PA" smtClean="0"/>
-              <a:t>30/7/19</a:t>
+              <a:t>08/01/2019</a:t>
             </a:fld>
             <a:endParaRPr lang="es-PA"/>
           </a:p>
@@ -1241,7 +1241,7 @@
           <a:p>
             <a:fld id="{85D24840-F501-4923-86F2-CAA58B03A346}" type="datetimeFigureOut">
               <a:rPr lang="es-PA" smtClean="0"/>
-              <a:t>30/7/19</a:t>
+              <a:t>08/01/2019</a:t>
             </a:fld>
             <a:endParaRPr lang="es-PA"/>
           </a:p>
@@ -1608,7 +1608,7 @@
           <a:p>
             <a:fld id="{85D24840-F501-4923-86F2-CAA58B03A346}" type="datetimeFigureOut">
               <a:rPr lang="es-PA" smtClean="0"/>
-              <a:t>30/7/19</a:t>
+              <a:t>08/01/2019</a:t>
             </a:fld>
             <a:endParaRPr lang="es-PA"/>
           </a:p>
@@ -1726,7 +1726,7 @@
           <a:p>
             <a:fld id="{85D24840-F501-4923-86F2-CAA58B03A346}" type="datetimeFigureOut">
               <a:rPr lang="es-PA" smtClean="0"/>
-              <a:t>30/7/19</a:t>
+              <a:t>08/01/2019</a:t>
             </a:fld>
             <a:endParaRPr lang="es-PA"/>
           </a:p>
@@ -1821,7 +1821,7 @@
           <a:p>
             <a:fld id="{85D24840-F501-4923-86F2-CAA58B03A346}" type="datetimeFigureOut">
               <a:rPr lang="es-PA" smtClean="0"/>
-              <a:t>30/7/19</a:t>
+              <a:t>08/01/2019</a:t>
             </a:fld>
             <a:endParaRPr lang="es-PA"/>
           </a:p>
@@ -2098,7 +2098,7 @@
           <a:p>
             <a:fld id="{85D24840-F501-4923-86F2-CAA58B03A346}" type="datetimeFigureOut">
               <a:rPr lang="es-PA" smtClean="0"/>
-              <a:t>30/7/19</a:t>
+              <a:t>08/01/2019</a:t>
             </a:fld>
             <a:endParaRPr lang="es-PA"/>
           </a:p>
@@ -2351,7 +2351,7 @@
           <a:p>
             <a:fld id="{85D24840-F501-4923-86F2-CAA58B03A346}" type="datetimeFigureOut">
               <a:rPr lang="es-PA" smtClean="0"/>
-              <a:t>30/7/19</a:t>
+              <a:t>08/01/2019</a:t>
             </a:fld>
             <a:endParaRPr lang="es-PA"/>
           </a:p>
@@ -2564,7 +2564,7 @@
           <a:p>
             <a:fld id="{85D24840-F501-4923-86F2-CAA58B03A346}" type="datetimeFigureOut">
               <a:rPr lang="es-PA" smtClean="0"/>
-              <a:t>30/7/19</a:t>
+              <a:t>08/01/2019</a:t>
             </a:fld>
             <a:endParaRPr lang="es-PA"/>
           </a:p>
@@ -2978,7 +2978,7 @@
           <p:nvPr>
             <p:extLst>
               <p:ext uri="{D42A27DB-BD31-4B8C-83A1-F6EECF244321}">
-                <p14:modId xmlns:p14="http://schemas.microsoft.com/office/powerpoint/2010/main" val="3523873798"/>
+                <p14:modId xmlns:p14="http://schemas.microsoft.com/office/powerpoint/2010/main" val="1987718643"/>
               </p:ext>
             </p:extLst>
           </p:nvPr>
@@ -3128,115 +3128,17 @@
                           <a:effectLst/>
                           <a:latin typeface="Calibri" panose="020F0502020204030204" pitchFamily="34" charset="0"/>
                         </a:rPr>
-                        <a:t> Nombre</a:t>
+                        <a:t> </a:t>
                       </a:r>
-                      <a:endParaRPr lang="es-PA" sz="1100" b="0" i="0" u="none" strike="noStrike" dirty="0">
-                        <a:solidFill>
-                          <a:srgbClr val="000000"/>
-                        </a:solidFill>
-                        <a:effectLst/>
-                        <a:latin typeface="Calibri" panose="020F0502020204030204" pitchFamily="34" charset="0"/>
-                      </a:endParaRPr>
-                    </a:p>
-                  </a:txBody>
-                  <a:tcPr marL="9525" marR="9525" marT="9525" marB="0" anchor="b">
-                    <a:lnL w="6350" cap="flat" cmpd="sng" algn="ctr">
-                      <a:solidFill>
-                        <a:srgbClr val="000000"/>
-                      </a:solidFill>
-                      <a:prstDash val="solid"/>
-                      <a:round/>
-                      <a:headEnd type="none" w="med" len="med"/>
-                      <a:tailEnd type="none" w="med" len="med"/>
-                    </a:lnL>
-                    <a:lnR w="6350" cap="flat" cmpd="sng" algn="ctr">
-                      <a:solidFill>
-                        <a:srgbClr val="000000"/>
-                      </a:solidFill>
-                      <a:prstDash val="solid"/>
-                      <a:round/>
-                      <a:headEnd type="none" w="med" len="med"/>
-                      <a:tailEnd type="none" w="med" len="med"/>
-                    </a:lnR>
-                    <a:lnT>
-                      <a:noFill/>
-                    </a:lnT>
-                    <a:lnB>
-                      <a:noFill/>
-                    </a:lnB>
-                  </a:tcPr>
-                </a:tc>
-              </a:tr>
-              <a:tr h="225582">
-                <a:tc>
-                  <a:txBody>
-                    <a:bodyPr/>
-                    <a:lstStyle/>
-                    <a:p>
-                      <a:pPr algn="l" fontAlgn="b"/>
                       <a:r>
-                        <a:rPr lang="es-PA" sz="1100" b="0" i="0" u="none" strike="noStrike" dirty="0" smtClean="0">
+                        <a:rPr lang="es-PA" sz="1100" b="0" i="0" u="none" strike="noStrike" dirty="0" err="1" smtClean="0">
                           <a:solidFill>
                             <a:srgbClr val="000000"/>
                           </a:solidFill>
                           <a:effectLst/>
                           <a:latin typeface="Calibri" panose="020F0502020204030204" pitchFamily="34" charset="0"/>
                         </a:rPr>
-                        <a:t> Apellido</a:t>
-                      </a:r>
-                      <a:endParaRPr lang="es-PA" sz="1100" b="0" i="0" u="none" strike="noStrike" dirty="0">
-                        <a:solidFill>
-                          <a:srgbClr val="000000"/>
-                        </a:solidFill>
-                        <a:effectLst/>
-                        <a:latin typeface="Calibri" panose="020F0502020204030204" pitchFamily="34" charset="0"/>
-                      </a:endParaRPr>
-                    </a:p>
-                  </a:txBody>
-                  <a:tcPr marL="9525" marR="9525" marT="9525" marB="0" anchor="b">
-                    <a:lnL w="6350" cap="flat" cmpd="sng" algn="ctr">
-                      <a:solidFill>
-                        <a:srgbClr val="000000"/>
-                      </a:solidFill>
-                      <a:prstDash val="solid"/>
-                      <a:round/>
-                      <a:headEnd type="none" w="med" len="med"/>
-                      <a:tailEnd type="none" w="med" len="med"/>
-                    </a:lnL>
-                    <a:lnR w="6350" cap="flat" cmpd="sng" algn="ctr">
-                      <a:solidFill>
-                        <a:srgbClr val="000000"/>
-                      </a:solidFill>
-                      <a:prstDash val="solid"/>
-                      <a:round/>
-                      <a:headEnd type="none" w="med" len="med"/>
-                      <a:tailEnd type="none" w="med" len="med"/>
-                    </a:lnR>
-                    <a:lnT>
-                      <a:noFill/>
-                    </a:lnT>
-                    <a:lnB>
-                      <a:noFill/>
-                    </a:lnB>
-                  </a:tcPr>
-                </a:tc>
-              </a:tr>
-              <a:tr h="225582">
-                <a:tc>
-                  <a:txBody>
-                    <a:bodyPr/>
-                    <a:lstStyle/>
-                    <a:p>
-                      <a:pPr algn="l" fontAlgn="b"/>
-                      <a:r>
-                        <a:rPr lang="es-PA" sz="1100" b="0" i="0" u="none" strike="noStrike" dirty="0" smtClean="0">
-                          <a:solidFill>
-                            <a:srgbClr val="000000"/>
-                          </a:solidFill>
-                          <a:effectLst/>
-                          <a:latin typeface="Calibri" panose="020F0502020204030204" pitchFamily="34" charset="0"/>
-                        </a:rPr>
-                        <a:t> Email</a:t>
+                        <a:t>first_name</a:t>
                       </a:r>
                       <a:endParaRPr lang="es-PA" sz="1100" b="0" i="0" u="none" strike="noStrike" dirty="0">
                         <a:solidFill>
@@ -3300,7 +3202,135 @@
                           <a:effectLst/>
                           <a:latin typeface="Calibri" panose="020F0502020204030204" pitchFamily="34" charset="0"/>
                         </a:rPr>
-                        <a:t>id_proyecto</a:t>
+                        <a:t>last_name</a:t>
+                      </a:r>
+                      <a:endParaRPr lang="es-PA" sz="1100" b="0" i="0" u="none" strike="noStrike" dirty="0">
+                        <a:solidFill>
+                          <a:srgbClr val="000000"/>
+                        </a:solidFill>
+                        <a:effectLst/>
+                        <a:latin typeface="Calibri" panose="020F0502020204030204" pitchFamily="34" charset="0"/>
+                      </a:endParaRPr>
+                    </a:p>
+                  </a:txBody>
+                  <a:tcPr marL="9525" marR="9525" marT="9525" marB="0" anchor="b">
+                    <a:lnL w="6350" cap="flat" cmpd="sng" algn="ctr">
+                      <a:solidFill>
+                        <a:srgbClr val="000000"/>
+                      </a:solidFill>
+                      <a:prstDash val="solid"/>
+                      <a:round/>
+                      <a:headEnd type="none" w="med" len="med"/>
+                      <a:tailEnd type="none" w="med" len="med"/>
+                    </a:lnL>
+                    <a:lnR w="6350" cap="flat" cmpd="sng" algn="ctr">
+                      <a:solidFill>
+                        <a:srgbClr val="000000"/>
+                      </a:solidFill>
+                      <a:prstDash val="solid"/>
+                      <a:round/>
+                      <a:headEnd type="none" w="med" len="med"/>
+                      <a:tailEnd type="none" w="med" len="med"/>
+                    </a:lnR>
+                    <a:lnT>
+                      <a:noFill/>
+                    </a:lnT>
+                    <a:lnB>
+                      <a:noFill/>
+                    </a:lnB>
+                  </a:tcPr>
+                </a:tc>
+              </a:tr>
+              <a:tr h="225582">
+                <a:tc>
+                  <a:txBody>
+                    <a:bodyPr/>
+                    <a:lstStyle/>
+                    <a:p>
+                      <a:pPr algn="l" fontAlgn="b"/>
+                      <a:r>
+                        <a:rPr lang="es-PA" sz="1100" b="0" i="0" u="none" strike="noStrike" dirty="0" smtClean="0">
+                          <a:solidFill>
+                            <a:srgbClr val="000000"/>
+                          </a:solidFill>
+                          <a:effectLst/>
+                          <a:latin typeface="Calibri" panose="020F0502020204030204" pitchFamily="34" charset="0"/>
+                        </a:rPr>
+                        <a:t> </a:t>
+                      </a:r>
+                      <a:r>
+                        <a:rPr lang="es-PA" sz="1100" b="0" i="0" u="none" strike="noStrike" dirty="0" smtClean="0">
+                          <a:solidFill>
+                            <a:srgbClr val="000000"/>
+                          </a:solidFill>
+                          <a:effectLst/>
+                          <a:latin typeface="Calibri" panose="020F0502020204030204" pitchFamily="34" charset="0"/>
+                        </a:rPr>
+                        <a:t>email</a:t>
+                      </a:r>
+                      <a:endParaRPr lang="es-PA" sz="1100" b="0" i="0" u="none" strike="noStrike" dirty="0">
+                        <a:solidFill>
+                          <a:srgbClr val="000000"/>
+                        </a:solidFill>
+                        <a:effectLst/>
+                        <a:latin typeface="Calibri" panose="020F0502020204030204" pitchFamily="34" charset="0"/>
+                      </a:endParaRPr>
+                    </a:p>
+                  </a:txBody>
+                  <a:tcPr marL="9525" marR="9525" marT="9525" marB="0" anchor="b">
+                    <a:lnL w="6350" cap="flat" cmpd="sng" algn="ctr">
+                      <a:solidFill>
+                        <a:srgbClr val="000000"/>
+                      </a:solidFill>
+                      <a:prstDash val="solid"/>
+                      <a:round/>
+                      <a:headEnd type="none" w="med" len="med"/>
+                      <a:tailEnd type="none" w="med" len="med"/>
+                    </a:lnL>
+                    <a:lnR w="6350" cap="flat" cmpd="sng" algn="ctr">
+                      <a:solidFill>
+                        <a:srgbClr val="000000"/>
+                      </a:solidFill>
+                      <a:prstDash val="solid"/>
+                      <a:round/>
+                      <a:headEnd type="none" w="med" len="med"/>
+                      <a:tailEnd type="none" w="med" len="med"/>
+                    </a:lnR>
+                    <a:lnT>
+                      <a:noFill/>
+                    </a:lnT>
+                    <a:lnB>
+                      <a:noFill/>
+                    </a:lnB>
+                  </a:tcPr>
+                </a:tc>
+              </a:tr>
+              <a:tr h="225582">
+                <a:tc>
+                  <a:txBody>
+                    <a:bodyPr/>
+                    <a:lstStyle/>
+                    <a:p>
+                      <a:pPr algn="l" fontAlgn="b"/>
+                      <a:r>
+                        <a:rPr lang="es-PA" sz="1100" b="0" i="0" u="none" strike="noStrike" dirty="0" smtClean="0">
+                          <a:solidFill>
+                            <a:srgbClr val="000000"/>
+                          </a:solidFill>
+                          <a:effectLst/>
+                          <a:latin typeface="Calibri" panose="020F0502020204030204" pitchFamily="34" charset="0"/>
+                        </a:rPr>
+                        <a:t> </a:t>
+                      </a:r>
+                      <a:r>
+                        <a:rPr lang="es-PA" sz="1100" b="0" i="0" u="none" strike="noStrike" dirty="0" err="1" smtClean="0">
+                          <a:solidFill>
+                            <a:srgbClr val="000000"/>
+                          </a:solidFill>
+                          <a:effectLst/>
+                          <a:latin typeface="Calibri" panose="020F0502020204030204" pitchFamily="34" charset="0"/>
+                        </a:rPr>
+                        <a:t>project_id</a:t>
                       </a:r>
                       <a:endParaRPr lang="es-PA" sz="1100" b="0" i="0" u="none" strike="noStrike" dirty="0" smtClean="0">
                         <a:solidFill>
@@ -4193,7 +4223,7 @@
           <p:nvPr>
             <p:extLst>
               <p:ext uri="{D42A27DB-BD31-4B8C-83A1-F6EECF244321}">
-                <p14:modId xmlns:p14="http://schemas.microsoft.com/office/powerpoint/2010/main" val="993765506"/>
+                <p14:modId xmlns:p14="http://schemas.microsoft.com/office/powerpoint/2010/main" val="1597725091"/>
               </p:ext>
             </p:extLst>
           </p:nvPr>
@@ -4353,7 +4383,71 @@
                           <a:effectLst/>
                           <a:latin typeface="Calibri" panose="020F0502020204030204" pitchFamily="34" charset="0"/>
                         </a:rPr>
-                        <a:t>id_usuario</a:t>
+                        <a:t>user_id</a:t>
+                      </a:r>
+                      <a:endParaRPr lang="es-PA" sz="1100" b="0" i="0" u="none" strike="noStrike" dirty="0">
+                        <a:solidFill>
+                          <a:srgbClr val="000000"/>
+                        </a:solidFill>
+                        <a:effectLst/>
+                        <a:latin typeface="Calibri" panose="020F0502020204030204" pitchFamily="34" charset="0"/>
+                      </a:endParaRPr>
+                    </a:p>
+                  </a:txBody>
+                  <a:tcPr marL="9525" marR="9525" marT="9525" marB="0" anchor="b">
+                    <a:lnL w="6350" cap="flat" cmpd="sng" algn="ctr">
+                      <a:solidFill>
+                        <a:srgbClr val="000000"/>
+                      </a:solidFill>
+                      <a:prstDash val="solid"/>
+                      <a:round/>
+                      <a:headEnd type="none" w="med" len="med"/>
+                      <a:tailEnd type="none" w="med" len="med"/>
+                    </a:lnL>
+                    <a:lnR w="6350" cap="flat" cmpd="sng" algn="ctr">
+                      <a:solidFill>
+                        <a:srgbClr val="000000"/>
+                      </a:solidFill>
+                      <a:prstDash val="solid"/>
+                      <a:round/>
+                      <a:headEnd type="none" w="med" len="med"/>
+                      <a:tailEnd type="none" w="med" len="med"/>
+                    </a:lnR>
+                    <a:lnT>
+                      <a:noFill/>
+                    </a:lnT>
+                    <a:lnB>
+                      <a:noFill/>
+                    </a:lnB>
+                  </a:tcPr>
+                </a:tc>
+              </a:tr>
+              <a:tr h="189752">
+                <a:tc>
+                  <a:txBody>
+                    <a:bodyPr/>
+                    <a:lstStyle/>
+                    <a:p>
+                      <a:pPr algn="l" fontAlgn="b"/>
+                      <a:r>
+                        <a:rPr lang="es-PA" sz="1100" b="0" i="0" u="none" strike="noStrike" baseline="0" dirty="0" smtClean="0">
+                          <a:solidFill>
+                            <a:srgbClr val="000000"/>
+                          </a:solidFill>
+                          <a:effectLst/>
+                          <a:latin typeface="Calibri" panose="020F0502020204030204" pitchFamily="34" charset="0"/>
+                        </a:rPr>
+                        <a:t> </a:t>
+                      </a:r>
+                      <a:r>
+                        <a:rPr lang="es-PA" sz="1100" b="0" i="0" u="none" strike="noStrike" baseline="0" dirty="0" err="1" smtClean="0">
+                          <a:solidFill>
+                            <a:srgbClr val="000000"/>
+                          </a:solidFill>
+                          <a:effectLst/>
+                          <a:latin typeface="Calibri" panose="020F0502020204030204" pitchFamily="34" charset="0"/>
+                        </a:rPr>
+                        <a:t>description</a:t>
                       </a:r>
                       <a:endParaRPr lang="es-PA" sz="1100" b="0" i="0" u="none" strike="noStrike" dirty="0">
                         <a:solidFill>
@@ -4410,14 +4504,14 @@
                         <a:t> </a:t>
                       </a:r>
                       <a:r>
-                        <a:rPr lang="es-PA" sz="1100" b="0" i="0" u="none" strike="noStrike" dirty="0" smtClean="0">
+                        <a:rPr lang="es-PA" sz="1100" b="0" i="0" u="none" strike="noStrike" dirty="0" err="1" smtClean="0">
                           <a:solidFill>
                             <a:srgbClr val="000000"/>
                           </a:solidFill>
                           <a:effectLst/>
                           <a:latin typeface="Calibri" panose="020F0502020204030204" pitchFamily="34" charset="0"/>
                         </a:rPr>
-                        <a:t>Descripción</a:t>
+                        <a:t>image</a:t>
                       </a:r>
                       <a:endParaRPr lang="es-PA" sz="1100" b="0" i="0" u="none" strike="noStrike" dirty="0">
                         <a:solidFill>
@@ -4464,68 +4558,14 @@
                     <a:p>
                       <a:pPr algn="l" fontAlgn="b"/>
                       <a:r>
-                        <a:rPr lang="es-PA" sz="1100" b="0" i="0" u="none" strike="noStrike" dirty="0" smtClean="0">
+                        <a:rPr lang="es-PA" sz="1100" b="0" i="0" u="none" strike="noStrike" baseline="0" dirty="0" smtClean="0">
                           <a:solidFill>
                             <a:srgbClr val="000000"/>
                           </a:solidFill>
                           <a:effectLst/>
                           <a:latin typeface="Calibri" panose="020F0502020204030204" pitchFamily="34" charset="0"/>
                         </a:rPr>
-                        <a:t> Imagen</a:t>
-                      </a:r>
-                      <a:endParaRPr lang="es-PA" sz="1100" b="0" i="0" u="none" strike="noStrike" dirty="0">
-                        <a:solidFill>
-                          <a:srgbClr val="000000"/>
-                        </a:solidFill>
-                        <a:effectLst/>
-                        <a:latin typeface="Calibri" panose="020F0502020204030204" pitchFamily="34" charset="0"/>
-                      </a:endParaRPr>
-                    </a:p>
-                  </a:txBody>
-                  <a:tcPr marL="9525" marR="9525" marT="9525" marB="0" anchor="b">
-                    <a:lnL w="6350" cap="flat" cmpd="sng" algn="ctr">
-                      <a:solidFill>
-                        <a:srgbClr val="000000"/>
-                      </a:solidFill>
-                      <a:prstDash val="solid"/>
-                      <a:round/>
-                      <a:headEnd type="none" w="med" len="med"/>
-                      <a:tailEnd type="none" w="med" len="med"/>
-                    </a:lnL>
-                    <a:lnR w="6350" cap="flat" cmpd="sng" algn="ctr">
-                      <a:solidFill>
-                        <a:srgbClr val="000000"/>
-                      </a:solidFill>
-                      <a:prstDash val="solid"/>
-                      <a:round/>
-                      <a:headEnd type="none" w="med" len="med"/>
-                      <a:tailEnd type="none" w="med" len="med"/>
-                    </a:lnR>
-                    <a:lnT>
-                      <a:noFill/>
-                    </a:lnT>
-                    <a:lnB>
-                      <a:noFill/>
-                    </a:lnB>
-                  </a:tcPr>
-                </a:tc>
-              </a:tr>
-              <a:tr h="189752">
-                <a:tc>
-                  <a:txBody>
-                    <a:bodyPr/>
-                    <a:lstStyle/>
-                    <a:p>
-                      <a:pPr algn="l" fontAlgn="b"/>
-                      <a:r>
-                        <a:rPr lang="es-PA" sz="1100" b="0" i="0" u="none" strike="noStrike" dirty="0" smtClean="0">
-                          <a:solidFill>
-                            <a:srgbClr val="000000"/>
-                          </a:solidFill>
-                          <a:effectLst/>
-                          <a:latin typeface="Calibri" panose="020F0502020204030204" pitchFamily="34" charset="0"/>
-                        </a:rPr>
-                        <a:t> Video</a:t>
+                        <a:t> video</a:t>
                       </a:r>
                       <a:endParaRPr lang="es-PA" sz="1100" b="0" i="0" u="none" strike="noStrike" dirty="0">
                         <a:solidFill>
@@ -4582,14 +4622,14 @@
                         <a:t> </a:t>
                       </a:r>
                       <a:r>
-                        <a:rPr lang="es-PA" sz="1100" b="0" i="0" u="none" strike="noStrike" dirty="0" smtClean="0">
+                        <a:rPr lang="es-PA" sz="1100" b="0" i="0" u="none" strike="noStrike" smtClean="0">
                           <a:solidFill>
                             <a:srgbClr val="000000"/>
                           </a:solidFill>
                           <a:effectLst/>
                           <a:latin typeface="Calibri" panose="020F0502020204030204" pitchFamily="34" charset="0"/>
                         </a:rPr>
-                        <a:t>Título</a:t>
+                        <a:t>title</a:t>
                       </a:r>
                       <a:endParaRPr lang="es-PA" sz="1100" b="0" i="0" u="none" strike="noStrike" dirty="0" smtClean="0">
                         <a:solidFill>
@@ -6534,7 +6574,7 @@
   <a:extraClrSchemeLst/>
   <a:extLst>
     <a:ext uri="{05A4C25C-085E-4340-85A3-A5531E510DB2}">
-      <thm15:themeFamily xmlns:thm15="http://schemas.microsoft.com/office/thememl/2012/main" name="Office Theme" id="{62F939B6-93AF-4DB8-9C6B-D6C7DFDC589F}" vid="{4A3C46E8-61CC-4603-A589-7422A47A8E4A}"/>
+      <thm15:themeFamily xmlns:thm15="http://schemas.microsoft.com/office/thememl/2012/main" xmlns="" name="Office Theme" id="{62F939B6-93AF-4DB8-9C6B-D6C7DFDC589F}" vid="{4A3C46E8-61CC-4603-A589-7422A47A8E4A}"/>
     </a:ext>
   </a:extLst>
 </a:theme>

</xml_diff>

<commit_message>
Cambie a ingles el nombre de las tablas que me habia quedado en español
</commit_message>
<xml_diff>
--- a/deposito-de-archivos/Tablas Vecinos Colaborativos.pptx
+++ b/deposito-de-archivos/Tablas Vecinos Colaborativos.pptx
@@ -106,7 +106,7 @@
   </p:defaultTextStyle>
   <p:extLst>
     <p:ext uri="{EFAFB233-063F-42B5-8137-9DF3F51BA10A}">
-      <p15:sldGuideLst xmlns:p15="http://schemas.microsoft.com/office/powerpoint/2012/main" xmlns=""/>
+      <p15:sldGuideLst xmlns="" xmlns:p15="http://schemas.microsoft.com/office/powerpoint/2012/main"/>
     </p:ext>
   </p:extLst>
 </p:presentation>
@@ -2978,14 +2978,14 @@
           <p:nvPr>
             <p:extLst>
               <p:ext uri="{D42A27DB-BD31-4B8C-83A1-F6EECF244321}">
-                <p14:modId xmlns:p14="http://schemas.microsoft.com/office/powerpoint/2010/main" val="1987718643"/>
+                <p14:modId xmlns:p14="http://schemas.microsoft.com/office/powerpoint/2010/main" val="1024396202"/>
               </p:ext>
             </p:extLst>
           </p:nvPr>
         </p:nvGraphicFramePr>
         <p:xfrm>
-          <a:off x="696036" y="450379"/>
-          <a:ext cx="1173707" cy="1483995"/>
+          <a:off x="630060" y="80889"/>
+          <a:ext cx="1173707" cy="1890081"/>
         </p:xfrm>
         <a:graphic>
           <a:graphicData uri="http://schemas.openxmlformats.org/drawingml/2006/table">
@@ -3002,15 +3002,22 @@
                     <a:p>
                       <a:pPr algn="l" fontAlgn="b"/>
                       <a:r>
-                        <a:rPr lang="es-PA" sz="1100" b="1" i="0" u="none" strike="noStrike" dirty="0">
+                        <a:rPr lang="es-PA" sz="1100" b="1" i="0" u="none" strike="noStrike" dirty="0" smtClean="0">
                           <a:solidFill>
                             <a:srgbClr val="000000"/>
                           </a:solidFill>
                           <a:effectLst/>
                           <a:latin typeface="Calibri" panose="020F0502020204030204" pitchFamily="34" charset="0"/>
                         </a:rPr>
-                        <a:t>USUARIO</a:t>
+                        <a:t>USERS</a:t>
                       </a:r>
+                      <a:endParaRPr lang="es-PA" sz="1100" b="1" i="0" u="none" strike="noStrike" dirty="0">
+                        <a:solidFill>
+                          <a:srgbClr val="000000"/>
+                        </a:solidFill>
+                        <a:effectLst/>
+                        <a:latin typeface="Calibri" panose="020F0502020204030204" pitchFamily="34" charset="0"/>
+                      </a:endParaRPr>
                     </a:p>
                   </a:txBody>
                   <a:tcPr marL="9525" marR="9525" marT="9525" marB="0" anchor="b">
@@ -3177,7 +3184,7 @@
                   </a:tcPr>
                 </a:tc>
               </a:tr>
-              <a:tr h="225582">
+              <a:tr h="549522">
                 <a:tc>
                   <a:txBody>
                     <a:bodyPr/>
@@ -3204,6 +3211,79 @@
                         </a:rPr>
                         <a:t>last_name</a:t>
                       </a:r>
+                      <a:endParaRPr lang="es-PA" sz="1100" b="0" i="0" u="none" strike="noStrike" dirty="0" smtClean="0">
+                        <a:solidFill>
+                          <a:srgbClr val="000000"/>
+                        </a:solidFill>
+                        <a:effectLst/>
+                        <a:latin typeface="Calibri" panose="020F0502020204030204" pitchFamily="34" charset="0"/>
+                      </a:endParaRPr>
+                    </a:p>
+                    <a:p>
+                      <a:pPr algn="l" fontAlgn="b"/>
+                      <a:r>
+                        <a:rPr lang="es-PA" sz="1100" b="0" i="0" u="none" strike="noStrike" baseline="0" dirty="0" smtClean="0">
+                          <a:solidFill>
+                            <a:srgbClr val="000000"/>
+                          </a:solidFill>
+                          <a:effectLst/>
+                          <a:latin typeface="Calibri" panose="020F0502020204030204" pitchFamily="34" charset="0"/>
+                        </a:rPr>
+                        <a:t> </a:t>
+                      </a:r>
+                      <a:r>
+                        <a:rPr lang="es-PA" sz="1100" b="0" i="0" u="none" strike="noStrike" baseline="0" smtClean="0">
+                          <a:solidFill>
+                            <a:srgbClr val="000000"/>
+                          </a:solidFill>
+                          <a:effectLst/>
+                          <a:latin typeface="Calibri" panose="020F0502020204030204" pitchFamily="34" charset="0"/>
+                        </a:rPr>
+                        <a:t>password</a:t>
+                      </a:r>
+                      <a:endParaRPr lang="es-PA" sz="1100" b="0" i="0" u="none" strike="noStrike" baseline="0" dirty="0" smtClean="0">
+                        <a:solidFill>
+                          <a:srgbClr val="000000"/>
+                        </a:solidFill>
+                        <a:effectLst/>
+                        <a:latin typeface="Calibri" panose="020F0502020204030204" pitchFamily="34" charset="0"/>
+                      </a:endParaRPr>
+                    </a:p>
+                    <a:p>
+                      <a:pPr algn="l" fontAlgn="b"/>
+                      <a:r>
+                        <a:rPr lang="es-PA" sz="1100" b="0" i="0" u="none" strike="noStrike" baseline="0" dirty="0" smtClean="0">
+                          <a:solidFill>
+                            <a:srgbClr val="000000"/>
+                          </a:solidFill>
+                          <a:effectLst/>
+                          <a:latin typeface="Calibri" panose="020F0502020204030204" pitchFamily="34" charset="0"/>
+                        </a:rPr>
+                        <a:t> country</a:t>
+                      </a:r>
+                    </a:p>
+                    <a:p>
+                      <a:pPr algn="l" fontAlgn="b"/>
+                      <a:r>
+                        <a:rPr lang="es-PA" sz="1100" b="0" i="0" u="none" strike="noStrike" baseline="0" dirty="0" smtClean="0">
+                          <a:solidFill>
+                            <a:srgbClr val="000000"/>
+                          </a:solidFill>
+                          <a:effectLst/>
+                          <a:latin typeface="Calibri" panose="020F0502020204030204" pitchFamily="34" charset="0"/>
+                        </a:rPr>
+                        <a:t> </a:t>
+                      </a:r>
+                      <a:r>
+                        <a:rPr lang="es-PA" sz="1100" b="0" i="0" u="none" strike="noStrike" baseline="0" dirty="0" err="1" smtClean="0">
+                          <a:solidFill>
+                            <a:srgbClr val="000000"/>
+                          </a:solidFill>
+                          <a:effectLst/>
+                          <a:latin typeface="Calibri" panose="020F0502020204030204" pitchFamily="34" charset="0"/>
+                        </a:rPr>
+                        <a:t>profile_pic</a:t>
+                      </a:r>
                       <a:endParaRPr lang="es-PA" sz="1100" b="0" i="0" u="none" strike="noStrike" dirty="0">
                         <a:solidFill>
                           <a:srgbClr val="000000"/>
@@ -3241,7 +3321,7 @@
                   </a:tcPr>
                 </a:tc>
               </a:tr>
-              <a:tr h="225582">
+              <a:tr h="127591">
                 <a:tc>
                   <a:txBody>
                     <a:bodyPr/>
@@ -3256,17 +3336,7 @@
                           <a:effectLst/>
                           <a:latin typeface="Calibri" panose="020F0502020204030204" pitchFamily="34" charset="0"/>
                         </a:rPr>
-                        <a:t> </a:t>
-                      </a:r>
-                      <a:r>
-                        <a:rPr lang="es-PA" sz="1100" b="0" i="0" u="none" strike="noStrike" dirty="0" smtClean="0">
-                          <a:solidFill>
-                            <a:srgbClr val="000000"/>
-                          </a:solidFill>
-                          <a:effectLst/>
-                          <a:latin typeface="Calibri" panose="020F0502020204030204" pitchFamily="34" charset="0"/>
-                        </a:rPr>
-                        <a:t>email</a:t>
+                        <a:t> email</a:t>
                       </a:r>
                       <a:endParaRPr lang="es-PA" sz="1100" b="0" i="0" u="none" strike="noStrike" dirty="0">
                         <a:solidFill>
@@ -4223,7 +4293,7 @@
           <p:nvPr>
             <p:extLst>
               <p:ext uri="{D42A27DB-BD31-4B8C-83A1-F6EECF244321}">
-                <p14:modId xmlns:p14="http://schemas.microsoft.com/office/powerpoint/2010/main" val="1597725091"/>
+                <p14:modId xmlns:p14="http://schemas.microsoft.com/office/powerpoint/2010/main" val="4015554509"/>
               </p:ext>
             </p:extLst>
           </p:nvPr>
@@ -4247,15 +4317,22 @@
                     <a:p>
                       <a:pPr algn="l" fontAlgn="b"/>
                       <a:r>
-                        <a:rPr lang="es-PA" sz="1100" b="1" i="0" u="none" strike="noStrike" dirty="0">
+                        <a:rPr lang="es-PA" sz="1100" b="1" i="0" u="none" strike="noStrike" dirty="0" smtClean="0">
                           <a:solidFill>
                             <a:srgbClr val="000000"/>
                           </a:solidFill>
                           <a:effectLst/>
                           <a:latin typeface="Calibri" panose="020F0502020204030204" pitchFamily="34" charset="0"/>
                         </a:rPr>
-                        <a:t>POSTEOS</a:t>
+                        <a:t>POSTS</a:t>
                       </a:r>
+                      <a:endParaRPr lang="es-PA" sz="1100" b="1" i="0" u="none" strike="noStrike" dirty="0">
+                        <a:solidFill>
+                          <a:srgbClr val="000000"/>
+                        </a:solidFill>
+                        <a:effectLst/>
+                        <a:latin typeface="Calibri" panose="020F0502020204030204" pitchFamily="34" charset="0"/>
+                      </a:endParaRPr>
                     </a:p>
                   </a:txBody>
                   <a:tcPr marL="9525" marR="9525" marT="9525" marB="0" anchor="b">
@@ -6574,7 +6651,7 @@
   <a:extraClrSchemeLst/>
   <a:extLst>
     <a:ext uri="{05A4C25C-085E-4340-85A3-A5531E510DB2}">
-      <thm15:themeFamily xmlns:thm15="http://schemas.microsoft.com/office/thememl/2012/main" xmlns="" name="Office Theme" id="{62F939B6-93AF-4DB8-9C6B-D6C7DFDC589F}" vid="{4A3C46E8-61CC-4603-A589-7422A47A8E4A}"/>
+      <thm15:themeFamily xmlns="" xmlns:thm15="http://schemas.microsoft.com/office/thememl/2012/main" name="Office Theme" id="{62F939B6-93AF-4DB8-9C6B-D6C7DFDC589F}" vid="{4A3C46E8-61CC-4603-A589-7422A47A8E4A}"/>
     </a:ext>
   </a:extLst>
 </a:theme>

</xml_diff>